<commit_message>
Update AdversarialBiasPresentation FINAL 7.9.20.pptx
</commit_message>
<xml_diff>
--- a/AdversarialBiasPresentation FINAL 7.9.20.pptx
+++ b/AdversarialBiasPresentation FINAL 7.9.20.pptx
@@ -124,6 +124,9 @@
   <p:extLst>
     <p:ext uri="{EFAFB233-063F-42B5-8137-9DF3F51BA10A}">
       <p15:sldGuideLst xmlns:p15="http://schemas.microsoft.com/office/powerpoint/2012/main"/>
+    </p:ext>
+    <p:ext uri="{2D200454-40CA-4A62-9FC3-DE9A4176ACB9}">
+      <p15:notesGuideLst xmlns:p15="http://schemas.microsoft.com/office/powerpoint/2012/main"/>
     </p:ext>
   </p:extLst>
 </p:presentation>
@@ -1116,7 +1119,7 @@
   <dgm:whole/>
   <dgm:extLst>
     <a:ext uri="http://schemas.microsoft.com/office/drawing/2008/diagram">
-      <dsp:dataModelExt xmlns:dsp="http://schemas.microsoft.com/office/drawing/2008/diagram" relId="rId6" minVer="http://schemas.openxmlformats.org/drawingml/2006/diagram"/>
+      <dsp:dataModelExt xmlns:dsp="http://schemas.microsoft.com/office/drawing/2008/diagram" relId="rId7" minVer="http://schemas.openxmlformats.org/drawingml/2006/diagram"/>
     </a:ext>
   </dgm:extLst>
 </dgm:dataModel>
@@ -3299,7 +3302,7 @@
           <a:bodyPr/>
           <a:lstStyle/>
           <a:p>
-            <a:endParaRPr lang="en-US"/>
+            <a:endParaRPr lang="en-US" dirty="0"/>
           </a:p>
         </p:txBody>
       </p:sp>
@@ -3322,7 +3325,7 @@
               <a:rPr lang="en-US" smtClean="0"/>
               <a:t>1</a:t>
             </a:fld>
-            <a:endParaRPr lang="en-US"/>
+            <a:endParaRPr lang="en-US" dirty="0"/>
           </a:p>
         </p:txBody>
       </p:sp>
@@ -3330,6 +3333,258 @@
     <p:extLst>
       <p:ext uri="{BB962C8B-B14F-4D97-AF65-F5344CB8AC3E}">
         <p14:creationId xmlns:p14="http://schemas.microsoft.com/office/powerpoint/2010/main" val="248492077"/>
+      </p:ext>
+    </p:extLst>
+  </p:cSld>
+  <p:clrMapOvr>
+    <a:masterClrMapping/>
+  </p:clrMapOvr>
+</p:notes>
+</file>
+
+<file path=ppt/notesSlides/notesSlide10.xml><?xml version="1.0" encoding="utf-8"?>
+<p:notes xmlns:a="http://schemas.openxmlformats.org/drawingml/2006/main" xmlns:r="http://schemas.openxmlformats.org/officeDocument/2006/relationships" xmlns:p="http://schemas.openxmlformats.org/presentationml/2006/main">
+  <p:cSld>
+    <p:spTree>
+      <p:nvGrpSpPr>
+        <p:cNvPr id="1" name=""/>
+        <p:cNvGrpSpPr/>
+        <p:nvPr/>
+      </p:nvGrpSpPr>
+      <p:grpSpPr>
+        <a:xfrm>
+          <a:off x="0" y="0"/>
+          <a:ext cx="0" cy="0"/>
+          <a:chOff x="0" y="0"/>
+          <a:chExt cx="0" cy="0"/>
+        </a:xfrm>
+      </p:grpSpPr>
+      <p:sp>
+        <p:nvSpPr>
+          <p:cNvPr id="2" name="Slide Image Placeholder 1"/>
+          <p:cNvSpPr>
+            <a:spLocks noGrp="1" noRot="1" noChangeAspect="1"/>
+          </p:cNvSpPr>
+          <p:nvPr>
+            <p:ph type="sldImg"/>
+          </p:nvPr>
+        </p:nvSpPr>
+        <p:spPr/>
+      </p:sp>
+      <p:sp>
+        <p:nvSpPr>
+          <p:cNvPr id="3" name="Notes Placeholder 2"/>
+          <p:cNvSpPr>
+            <a:spLocks noGrp="1"/>
+          </p:cNvSpPr>
+          <p:nvPr>
+            <p:ph type="body" idx="1"/>
+          </p:nvPr>
+        </p:nvSpPr>
+        <p:spPr/>
+        <p:txBody>
+          <a:bodyPr/>
+          <a:lstStyle/>
+          <a:p>
+            <a:endParaRPr lang="en-US" dirty="0"/>
+          </a:p>
+        </p:txBody>
+      </p:sp>
+      <p:sp>
+        <p:nvSpPr>
+          <p:cNvPr id="4" name="Slide Number Placeholder 3"/>
+          <p:cNvSpPr>
+            <a:spLocks noGrp="1"/>
+          </p:cNvSpPr>
+          <p:nvPr>
+            <p:ph type="sldNum" sz="quarter" idx="5"/>
+          </p:nvPr>
+        </p:nvSpPr>
+        <p:spPr/>
+        <p:txBody>
+          <a:bodyPr/>
+          <a:lstStyle/>
+          <a:p>
+            <a:fld id="{BAA9633A-392A-4347-9D1C-FF5FFE9476B1}" type="slidenum">
+              <a:rPr lang="en-US" smtClean="0"/>
+              <a:t>10</a:t>
+            </a:fld>
+            <a:endParaRPr lang="en-US" dirty="0"/>
+          </a:p>
+        </p:txBody>
+      </p:sp>
+    </p:spTree>
+    <p:extLst>
+      <p:ext uri="{BB962C8B-B14F-4D97-AF65-F5344CB8AC3E}">
+        <p14:creationId xmlns:p14="http://schemas.microsoft.com/office/powerpoint/2010/main" val="1636810815"/>
+      </p:ext>
+    </p:extLst>
+  </p:cSld>
+  <p:clrMapOvr>
+    <a:masterClrMapping/>
+  </p:clrMapOvr>
+</p:notes>
+</file>
+
+<file path=ppt/notesSlides/notesSlide11.xml><?xml version="1.0" encoding="utf-8"?>
+<p:notes xmlns:a="http://schemas.openxmlformats.org/drawingml/2006/main" xmlns:r="http://schemas.openxmlformats.org/officeDocument/2006/relationships" xmlns:p="http://schemas.openxmlformats.org/presentationml/2006/main">
+  <p:cSld>
+    <p:spTree>
+      <p:nvGrpSpPr>
+        <p:cNvPr id="1" name=""/>
+        <p:cNvGrpSpPr/>
+        <p:nvPr/>
+      </p:nvGrpSpPr>
+      <p:grpSpPr>
+        <a:xfrm>
+          <a:off x="0" y="0"/>
+          <a:ext cx="0" cy="0"/>
+          <a:chOff x="0" y="0"/>
+          <a:chExt cx="0" cy="0"/>
+        </a:xfrm>
+      </p:grpSpPr>
+      <p:sp>
+        <p:nvSpPr>
+          <p:cNvPr id="2" name="Slide Image Placeholder 1"/>
+          <p:cNvSpPr>
+            <a:spLocks noGrp="1" noRot="1" noChangeAspect="1"/>
+          </p:cNvSpPr>
+          <p:nvPr>
+            <p:ph type="sldImg"/>
+          </p:nvPr>
+        </p:nvSpPr>
+        <p:spPr/>
+      </p:sp>
+      <p:sp>
+        <p:nvSpPr>
+          <p:cNvPr id="3" name="Notes Placeholder 2"/>
+          <p:cNvSpPr>
+            <a:spLocks noGrp="1"/>
+          </p:cNvSpPr>
+          <p:nvPr>
+            <p:ph type="body" idx="1"/>
+          </p:nvPr>
+        </p:nvSpPr>
+        <p:spPr/>
+        <p:txBody>
+          <a:bodyPr/>
+          <a:lstStyle/>
+          <a:p>
+            <a:endParaRPr lang="en-US" dirty="0"/>
+          </a:p>
+        </p:txBody>
+      </p:sp>
+      <p:sp>
+        <p:nvSpPr>
+          <p:cNvPr id="4" name="Slide Number Placeholder 3"/>
+          <p:cNvSpPr>
+            <a:spLocks noGrp="1"/>
+          </p:cNvSpPr>
+          <p:nvPr>
+            <p:ph type="sldNum" sz="quarter" idx="5"/>
+          </p:nvPr>
+        </p:nvSpPr>
+        <p:spPr/>
+        <p:txBody>
+          <a:bodyPr/>
+          <a:lstStyle/>
+          <a:p>
+            <a:fld id="{BAA9633A-392A-4347-9D1C-FF5FFE9476B1}" type="slidenum">
+              <a:rPr lang="en-US" smtClean="0"/>
+              <a:t>11</a:t>
+            </a:fld>
+            <a:endParaRPr lang="en-US" dirty="0"/>
+          </a:p>
+        </p:txBody>
+      </p:sp>
+    </p:spTree>
+    <p:extLst>
+      <p:ext uri="{BB962C8B-B14F-4D97-AF65-F5344CB8AC3E}">
+        <p14:creationId xmlns:p14="http://schemas.microsoft.com/office/powerpoint/2010/main" val="740162289"/>
+      </p:ext>
+    </p:extLst>
+  </p:cSld>
+  <p:clrMapOvr>
+    <a:masterClrMapping/>
+  </p:clrMapOvr>
+</p:notes>
+</file>
+
+<file path=ppt/notesSlides/notesSlide12.xml><?xml version="1.0" encoding="utf-8"?>
+<p:notes xmlns:a="http://schemas.openxmlformats.org/drawingml/2006/main" xmlns:r="http://schemas.openxmlformats.org/officeDocument/2006/relationships" xmlns:p="http://schemas.openxmlformats.org/presentationml/2006/main">
+  <p:cSld>
+    <p:spTree>
+      <p:nvGrpSpPr>
+        <p:cNvPr id="1" name=""/>
+        <p:cNvGrpSpPr/>
+        <p:nvPr/>
+      </p:nvGrpSpPr>
+      <p:grpSpPr>
+        <a:xfrm>
+          <a:off x="0" y="0"/>
+          <a:ext cx="0" cy="0"/>
+          <a:chOff x="0" y="0"/>
+          <a:chExt cx="0" cy="0"/>
+        </a:xfrm>
+      </p:grpSpPr>
+      <p:sp>
+        <p:nvSpPr>
+          <p:cNvPr id="2" name="Slide Image Placeholder 1"/>
+          <p:cNvSpPr>
+            <a:spLocks noGrp="1" noRot="1" noChangeAspect="1"/>
+          </p:cNvSpPr>
+          <p:nvPr>
+            <p:ph type="sldImg"/>
+          </p:nvPr>
+        </p:nvSpPr>
+        <p:spPr/>
+      </p:sp>
+      <p:sp>
+        <p:nvSpPr>
+          <p:cNvPr id="3" name="Notes Placeholder 2"/>
+          <p:cNvSpPr>
+            <a:spLocks noGrp="1"/>
+          </p:cNvSpPr>
+          <p:nvPr>
+            <p:ph type="body" idx="1"/>
+          </p:nvPr>
+        </p:nvSpPr>
+        <p:spPr/>
+        <p:txBody>
+          <a:bodyPr/>
+          <a:lstStyle/>
+          <a:p>
+            <a:endParaRPr lang="en-US" dirty="0"/>
+          </a:p>
+        </p:txBody>
+      </p:sp>
+      <p:sp>
+        <p:nvSpPr>
+          <p:cNvPr id="4" name="Slide Number Placeholder 3"/>
+          <p:cNvSpPr>
+            <a:spLocks noGrp="1"/>
+          </p:cNvSpPr>
+          <p:nvPr>
+            <p:ph type="sldNum" sz="quarter" idx="5"/>
+          </p:nvPr>
+        </p:nvSpPr>
+        <p:spPr/>
+        <p:txBody>
+          <a:bodyPr/>
+          <a:lstStyle/>
+          <a:p>
+            <a:fld id="{BAA9633A-392A-4347-9D1C-FF5FFE9476B1}" type="slidenum">
+              <a:rPr lang="en-US" smtClean="0"/>
+              <a:t>12</a:t>
+            </a:fld>
+            <a:endParaRPr lang="en-US" dirty="0"/>
+          </a:p>
+        </p:txBody>
+      </p:sp>
+    </p:spTree>
+    <p:extLst>
+      <p:ext uri="{BB962C8B-B14F-4D97-AF65-F5344CB8AC3E}">
+        <p14:creationId xmlns:p14="http://schemas.microsoft.com/office/powerpoint/2010/main" val="3838501614"/>
       </p:ext>
     </p:extLst>
   </p:cSld>
@@ -3383,97 +3638,34 @@
           <a:bodyPr/>
           <a:lstStyle/>
           <a:p>
-            <a:pPr marL="171450" indent="-171450">
-              <a:buFont typeface="Arial" panose="020B0604020202020204" pitchFamily="34" charset="0"/>
-              <a:buChar char="•"/>
-            </a:pPr>
-            <a:r>
-              <a:rPr lang="en-US" sz="1200" kern="1200" dirty="0">
-                <a:solidFill>
-                  <a:schemeClr val="tx1"/>
-                </a:solidFill>
-                <a:effectLst/>
-                <a:latin typeface="+mn-lt"/>
-                <a:ea typeface="+mn-ea"/>
-                <a:cs typeface="+mn-cs"/>
-              </a:rPr>
-              <a:t>We got our inspiration from the GANS Framework</a:t>
-            </a:r>
-          </a:p>
-          <a:p>
-            <a:pPr marL="171450" indent="-171450">
-              <a:buFont typeface="Arial" panose="020B0604020202020204" pitchFamily="34" charset="0"/>
-              <a:buChar char="•"/>
-            </a:pPr>
-            <a:r>
-              <a:rPr lang="en-US" sz="1200" kern="1200" dirty="0">
-                <a:solidFill>
-                  <a:schemeClr val="tx1"/>
-                </a:solidFill>
-                <a:effectLst/>
-                <a:latin typeface="+mn-lt"/>
-                <a:ea typeface="+mn-ea"/>
-                <a:cs typeface="+mn-cs"/>
-              </a:rPr>
-              <a:t>You have two algorithms competing against each other trying to minimize some loss function </a:t>
-            </a:r>
-          </a:p>
-          <a:p>
-            <a:pPr marL="171450" indent="-171450">
-              <a:buFont typeface="Arial" panose="020B0604020202020204" pitchFamily="34" charset="0"/>
-              <a:buChar char="•"/>
-            </a:pPr>
-            <a:r>
-              <a:rPr lang="en-US" sz="1200" kern="1200" dirty="0">
-                <a:solidFill>
-                  <a:schemeClr val="tx1"/>
-                </a:solidFill>
-                <a:effectLst/>
-                <a:latin typeface="+mn-lt"/>
-                <a:ea typeface="+mn-ea"/>
-                <a:cs typeface="+mn-cs"/>
-              </a:rPr>
-              <a:t>In the first image you have real data passed to the discriminator (agl1) to predict if it is real or not.</a:t>
-            </a:r>
-          </a:p>
-          <a:p>
-            <a:pPr marL="171450" indent="-171450">
-              <a:buFont typeface="Arial" panose="020B0604020202020204" pitchFamily="34" charset="0"/>
-              <a:buChar char="•"/>
-            </a:pPr>
-            <a:r>
-              <a:rPr lang="en-US" sz="1200" kern="1200" dirty="0">
-                <a:solidFill>
-                  <a:schemeClr val="tx1"/>
-                </a:solidFill>
-                <a:effectLst/>
-                <a:latin typeface="+mn-lt"/>
-                <a:ea typeface="+mn-ea"/>
-                <a:cs typeface="+mn-cs"/>
-              </a:rPr>
-              <a:t>In the second you have the generator taking noise and transforming it in its network to try and trick the discriminator. </a:t>
-            </a:r>
-          </a:p>
-          <a:p>
-            <a:pPr marL="171450" indent="-171450">
-              <a:buFont typeface="Arial" panose="020B0604020202020204" pitchFamily="34" charset="0"/>
-              <a:buChar char="•"/>
-            </a:pPr>
-            <a:r>
-              <a:rPr lang="en-US" sz="1200" kern="1200" dirty="0">
-                <a:solidFill>
-                  <a:schemeClr val="tx1"/>
-                </a:solidFill>
-                <a:effectLst/>
-                <a:latin typeface="+mn-lt"/>
-                <a:ea typeface="+mn-ea"/>
-                <a:cs typeface="+mn-cs"/>
-              </a:rPr>
-              <a:t>Depending on what network was wrong, that is the one that will be updated. </a:t>
-            </a:r>
-          </a:p>
-          <a:p>
-            <a:endParaRPr lang="en-US" dirty="0"/>
+            <a:r>
+              <a:rPr lang="en-US" sz="1600" dirty="0"/>
+              <a:t>Data is driving decision-making almost everywhere, but how? What criteria are considered? What if the outcomes are biased?</a:t>
+            </a:r>
+          </a:p>
+          <a:p>
+            <a:r>
+              <a:rPr lang="en-US" sz="1600" dirty="0"/>
+              <a:t> </a:t>
+            </a:r>
+          </a:p>
+          <a:p>
+            <a:r>
+              <a:rPr lang="en-US" sz="1600" dirty="0"/>
+              <a:t>As the cartoon notes, over the last few years, the machine learning community is acknowledging BOTH the prevalence and consequence of bias and fairness in ML. </a:t>
+            </a:r>
+          </a:p>
+          <a:p>
+            <a:r>
+              <a:rPr lang="en-US" sz="1600" dirty="0"/>
+              <a:t> </a:t>
+            </a:r>
+          </a:p>
+          <a:p>
+            <a:r>
+              <a:rPr lang="en-US" sz="1600" dirty="0"/>
+              <a:t>For the purposes of our work – think of bias and fairness as complementary forces. Our goal is to reduce bias in the hopes of increasing fairness. </a:t>
+            </a:r>
           </a:p>
         </p:txBody>
       </p:sp>
@@ -3494,16 +3686,16 @@
           <a:p>
             <a:fld id="{BAA9633A-392A-4347-9D1C-FF5FFE9476B1}" type="slidenum">
               <a:rPr lang="en-US" smtClean="0"/>
-              <a:t>5</a:t>
+              <a:t>2</a:t>
             </a:fld>
-            <a:endParaRPr lang="en-US"/>
+            <a:endParaRPr lang="en-US" dirty="0"/>
           </a:p>
         </p:txBody>
       </p:sp>
     </p:spTree>
     <p:extLst>
       <p:ext uri="{BB962C8B-B14F-4D97-AF65-F5344CB8AC3E}">
-        <p14:creationId xmlns:p14="http://schemas.microsoft.com/office/powerpoint/2010/main" val="2740084309"/>
+        <p14:creationId xmlns:p14="http://schemas.microsoft.com/office/powerpoint/2010/main" val="758812254"/>
       </p:ext>
     </p:extLst>
   </p:cSld>
@@ -3558,45 +3750,60 @@
           <a:lstStyle/>
           <a:p>
             <a:r>
-              <a:rPr lang="en-US" sz="1200" kern="1200" dirty="0">
-                <a:solidFill>
-                  <a:schemeClr val="tx1"/>
-                </a:solidFill>
-                <a:effectLst/>
-                <a:latin typeface="+mn-lt"/>
-                <a:ea typeface="+mn-ea"/>
-                <a:cs typeface="+mn-cs"/>
-              </a:rPr>
-              <a:t>We used the synthetic IBM Attrition data for our experiment. </a:t>
-            </a:r>
-          </a:p>
-          <a:p>
-            <a:r>
-              <a:rPr lang="en-US" sz="1200" kern="1200" dirty="0">
-                <a:solidFill>
-                  <a:schemeClr val="tx1"/>
-                </a:solidFill>
-                <a:effectLst/>
-                <a:latin typeface="+mn-lt"/>
-                <a:ea typeface="+mn-ea"/>
-                <a:cs typeface="+mn-cs"/>
-              </a:rPr>
-              <a:t>As you can see the data is unbalanced with yellow = they left. </a:t>
-            </a:r>
-          </a:p>
-          <a:p>
-            <a:r>
-              <a:rPr lang="en-US" sz="1200" kern="1200" dirty="0">
-                <a:solidFill>
-                  <a:schemeClr val="tx1"/>
-                </a:solidFill>
-                <a:effectLst/>
-                <a:latin typeface="+mn-lt"/>
-                <a:ea typeface="+mn-ea"/>
-                <a:cs typeface="+mn-cs"/>
-              </a:rPr>
-              <a:t>The younger Age groups have a greater percentage of attrition.  </a:t>
-            </a:r>
+              <a:rPr lang="en-US" sz="1600" dirty="0"/>
+              <a:t>This graphic from the IBM fairness tool kit summarizes a machine learning process. Focus on the red circles I’ve added as key points where bias can have major impact. </a:t>
+            </a:r>
+          </a:p>
+          <a:p>
+            <a:r>
+              <a:rPr lang="en-US" sz="1600" dirty="0"/>
+              <a:t> </a:t>
+            </a:r>
+          </a:p>
+          <a:p>
+            <a:pPr marL="285750" lvl="0" indent="-285750">
+              <a:buFont typeface="Arial" panose="020B0604020202020204" pitchFamily="34" charset="0"/>
+              <a:buChar char="•"/>
+            </a:pPr>
+            <a:r>
+              <a:rPr lang="en-US" sz="1600" dirty="0"/>
+              <a:t>Bias in Data: related to data’s origin, collection or sampling. UNFORTUNATELY, removing a protected variable or leaving it out of the model will not remove bias. </a:t>
+            </a:r>
+          </a:p>
+          <a:p>
+            <a:r>
+              <a:rPr lang="en-US" sz="1600" dirty="0"/>
+              <a:t> </a:t>
+            </a:r>
+          </a:p>
+          <a:p>
+            <a:pPr marL="285750" lvl="0" indent="-285750">
+              <a:buFont typeface="Arial" panose="020B0604020202020204" pitchFamily="34" charset="0"/>
+              <a:buChar char="•"/>
+            </a:pPr>
+            <a:r>
+              <a:rPr lang="en-US" sz="1600" dirty="0"/>
+              <a:t>Bias in Algorithmic Process: when we select, create, tune models. </a:t>
+            </a:r>
+          </a:p>
+          <a:p>
+            <a:r>
+              <a:rPr lang="en-US" sz="1600" dirty="0"/>
+              <a:t> </a:t>
+            </a:r>
+          </a:p>
+          <a:p>
+            <a:pPr marL="285750" lvl="0" indent="-285750">
+              <a:buFont typeface="Arial" panose="020B0604020202020204" pitchFamily="34" charset="0"/>
+              <a:buChar char="•"/>
+            </a:pPr>
+            <a:r>
+              <a:rPr lang="en-US" sz="1600" dirty="0"/>
+              <a:t>Bias in Implementation: which I think of as related to people as this is where bias and fairness are most visible to the widest community.</a:t>
+            </a:r>
+          </a:p>
+          <a:p>
+            <a:endParaRPr lang="en-US" dirty="0"/>
           </a:p>
         </p:txBody>
       </p:sp>
@@ -3617,16 +3824,16 @@
           <a:p>
             <a:fld id="{BAA9633A-392A-4347-9D1C-FF5FFE9476B1}" type="slidenum">
               <a:rPr lang="en-US" smtClean="0"/>
-              <a:t>6</a:t>
+              <a:t>3</a:t>
             </a:fld>
-            <a:endParaRPr lang="en-US"/>
+            <a:endParaRPr lang="en-US" dirty="0"/>
           </a:p>
         </p:txBody>
       </p:sp>
     </p:spTree>
     <p:extLst>
       <p:ext uri="{BB962C8B-B14F-4D97-AF65-F5344CB8AC3E}">
-        <p14:creationId xmlns:p14="http://schemas.microsoft.com/office/powerpoint/2010/main" val="582835802"/>
+        <p14:creationId xmlns:p14="http://schemas.microsoft.com/office/powerpoint/2010/main" val="2466146525"/>
       </p:ext>
     </p:extLst>
   </p:cSld>
@@ -3680,75 +3887,57 @@
           <a:bodyPr/>
           <a:lstStyle/>
           <a:p>
-            <a:pPr marL="171450" indent="-171450">
+            <a:r>
+              <a:rPr lang="en-US" sz="1600" dirty="0"/>
+              <a:t>During the ALGORITHMIC PROCESS, 3 additional points to intervene:</a:t>
+            </a:r>
+          </a:p>
+          <a:p>
+            <a:r>
+              <a:rPr lang="en-US" sz="1600" dirty="0"/>
+              <a:t> </a:t>
+            </a:r>
+          </a:p>
+          <a:p>
+            <a:pPr marL="285750" lvl="0" indent="-285750">
               <a:buFont typeface="Arial" panose="020B0604020202020204" pitchFamily="34" charset="0"/>
               <a:buChar char="•"/>
             </a:pPr>
             <a:r>
-              <a:rPr lang="en-US" sz="1200" kern="1200" dirty="0">
-                <a:solidFill>
-                  <a:schemeClr val="tx1"/>
-                </a:solidFill>
-                <a:effectLst/>
-                <a:latin typeface="+mn-lt"/>
-                <a:ea typeface="+mn-ea"/>
-                <a:cs typeface="+mn-cs"/>
-              </a:rPr>
-              <a:t>Age is a protected attribute and we do not want age to influence the outcome.</a:t>
-            </a:r>
-          </a:p>
-          <a:p>
-            <a:pPr marL="171450" indent="-171450">
+              <a:rPr lang="en-US" sz="1600" dirty="0"/>
+              <a:t>Preprocessing, where modify the training data specifically</a:t>
+            </a:r>
+          </a:p>
+          <a:p>
+            <a:pPr marL="285750" lvl="0" indent="-285750">
               <a:buFont typeface="Arial" panose="020B0604020202020204" pitchFamily="34" charset="0"/>
               <a:buChar char="•"/>
             </a:pPr>
             <a:r>
-              <a:rPr lang="en-US" sz="1200" kern="1200" dirty="0">
-                <a:solidFill>
-                  <a:schemeClr val="tx1"/>
-                </a:solidFill>
-                <a:effectLst/>
-                <a:latin typeface="+mn-lt"/>
-                <a:ea typeface="+mn-ea"/>
-                <a:cs typeface="+mn-cs"/>
-              </a:rPr>
-              <a:t>Most the time the protected attributes are just dropped, but other variables could be used as a substitute or is correlated with the protected attribute. </a:t>
-            </a:r>
-          </a:p>
-          <a:p>
-            <a:pPr marL="171450" indent="-171450">
+              <a:rPr lang="en-US" sz="1600" dirty="0"/>
+              <a:t>In Processing to modify learning algorithms to address bias by changing an objective function or imposing a new constraint. </a:t>
+            </a:r>
+          </a:p>
+          <a:p>
+            <a:pPr marL="285750" lvl="0" indent="-285750">
               <a:buFont typeface="Arial" panose="020B0604020202020204" pitchFamily="34" charset="0"/>
               <a:buChar char="•"/>
             </a:pPr>
             <a:r>
-              <a:rPr lang="en-US" sz="1200" kern="1200" dirty="0">
-                <a:solidFill>
-                  <a:schemeClr val="tx1"/>
-                </a:solidFill>
-                <a:effectLst/>
-                <a:latin typeface="+mn-lt"/>
-                <a:ea typeface="+mn-ea"/>
-                <a:cs typeface="+mn-cs"/>
-              </a:rPr>
-              <a:t>For example, years worked at the company </a:t>
-            </a:r>
-          </a:p>
-          <a:p>
-            <a:pPr marL="171450" indent="-171450">
-              <a:buFont typeface="Arial" panose="020B0604020202020204" pitchFamily="34" charset="0"/>
-              <a:buChar char="•"/>
-            </a:pPr>
-            <a:r>
-              <a:rPr lang="en-US" sz="1200" kern="1200" dirty="0">
-                <a:solidFill>
-                  <a:schemeClr val="tx1"/>
-                </a:solidFill>
-                <a:effectLst/>
-                <a:latin typeface="+mn-lt"/>
-                <a:ea typeface="+mn-ea"/>
-                <a:cs typeface="+mn-cs"/>
-              </a:rPr>
-              <a:t>Our goal is to achieve or get closer to Demographic Parity by distributing accuracy across the age groups. </a:t>
+              <a:rPr lang="en-US" sz="1600" dirty="0"/>
+              <a:t>Or Postprocessing, when model training is complete but bias mitigation could be applied to the resulting predicted labels.</a:t>
+            </a:r>
+          </a:p>
+          <a:p>
+            <a:r>
+              <a:rPr lang="en-US" sz="1600" dirty="0"/>
+              <a:t> </a:t>
+            </a:r>
+          </a:p>
+          <a:p>
+            <a:r>
+              <a:rPr lang="en-US" sz="1600" dirty="0"/>
+              <a:t>Of particular interest to this team is the IN PROCESS use of adversarial networks.</a:t>
             </a:r>
           </a:p>
           <a:p>
@@ -3773,16 +3962,16 @@
           <a:p>
             <a:fld id="{BAA9633A-392A-4347-9D1C-FF5FFE9476B1}" type="slidenum">
               <a:rPr lang="en-US" smtClean="0"/>
-              <a:t>7</a:t>
+              <a:t>4</a:t>
             </a:fld>
-            <a:endParaRPr lang="en-US"/>
+            <a:endParaRPr lang="en-US" dirty="0"/>
           </a:p>
         </p:txBody>
       </p:sp>
     </p:spTree>
     <p:extLst>
       <p:ext uri="{BB962C8B-B14F-4D97-AF65-F5344CB8AC3E}">
-        <p14:creationId xmlns:p14="http://schemas.microsoft.com/office/powerpoint/2010/main" val="3021403496"/>
+        <p14:creationId xmlns:p14="http://schemas.microsoft.com/office/powerpoint/2010/main" val="677695199"/>
       </p:ext>
     </p:extLst>
   </p:cSld>
@@ -3850,7 +4039,7 @@
                 <a:ea typeface="+mn-ea"/>
                 <a:cs typeface="+mn-cs"/>
               </a:rPr>
-              <a:t>We start with a baseline to see how close we are to demographic parity.  </a:t>
+              <a:t>We got our inspiration from the GANS Framework</a:t>
             </a:r>
           </a:p>
           <a:p>
@@ -3868,23 +4057,8 @@
                 <a:ea typeface="+mn-ea"/>
                 <a:cs typeface="+mn-cs"/>
               </a:rPr>
-              <a:t>We created a simple neural net  in the fashion of a logistic regression model. The idea is not to build the most accurate model but show that an adversarial can remove bias. </a:t>
-            </a:r>
-          </a:p>
-          <a:p>
-            <a:pPr marL="171450" indent="-171450">
-              <a:buFont typeface="Arial" panose="020B0604020202020204" pitchFamily="34" charset="0"/>
-              <a:buChar char="•"/>
-            </a:pPr>
-            <a:endParaRPr lang="en-US" sz="1200" kern="1200" dirty="0">
-              <a:solidFill>
-                <a:schemeClr val="tx1"/>
-              </a:solidFill>
-              <a:effectLst/>
-              <a:latin typeface="+mn-lt"/>
-              <a:ea typeface="+mn-ea"/>
-              <a:cs typeface="+mn-cs"/>
-            </a:endParaRPr>
+              <a:t>You have two algorithms competing against each other trying to minimize some loss function </a:t>
+            </a:r>
           </a:p>
           <a:p>
             <a:pPr marL="171450" indent="-171450">
@@ -3901,7 +4075,7 @@
                 <a:ea typeface="+mn-ea"/>
                 <a:cs typeface="+mn-cs"/>
               </a:rPr>
-              <a:t>The adversarial framework adds in our adversarial model that tries to predict age (our protected variable).</a:t>
+              <a:t>In the first image you have real data passed to the discriminator (agl1) to predict if it is real or not.</a:t>
             </a:r>
           </a:p>
           <a:p>
@@ -3919,7 +4093,7 @@
                 <a:ea typeface="+mn-ea"/>
                 <a:cs typeface="+mn-cs"/>
               </a:rPr>
-              <a:t>The adversarial and the prediction models are wrapped together with a modified MSE that has a  tunable parameter to dampen the gradients. </a:t>
+              <a:t>In the second you have the generator taking noise and transforming it in its network to try and trick the discriminator. </a:t>
             </a:r>
           </a:p>
           <a:p>
@@ -3937,25 +4111,7 @@
                 <a:ea typeface="+mn-ea"/>
                 <a:cs typeface="+mn-cs"/>
               </a:rPr>
-              <a:t>The loss is maximized because we want the model to be bad at predicting age. </a:t>
-            </a:r>
-          </a:p>
-          <a:p>
-            <a:pPr marL="171450" indent="-171450">
-              <a:buFont typeface="Arial" panose="020B0604020202020204" pitchFamily="34" charset="0"/>
-              <a:buChar char="•"/>
-            </a:pPr>
-            <a:r>
-              <a:rPr lang="en-US" sz="1200" kern="1200" dirty="0">
-                <a:solidFill>
-                  <a:schemeClr val="tx1"/>
-                </a:solidFill>
-                <a:effectLst/>
-                <a:latin typeface="+mn-lt"/>
-                <a:ea typeface="+mn-ea"/>
-                <a:cs typeface="+mn-cs"/>
-              </a:rPr>
-              <a:t>The prediction algorithm is the same as in our baseline  except the weights are modified from the MSE loss function as well as its original loss function .  </a:t>
+              <a:t>Depending on what network was wrong, that is the one that will be updated. </a:t>
             </a:r>
           </a:p>
           <a:p>
@@ -3980,16 +4136,16 @@
           <a:p>
             <a:fld id="{BAA9633A-392A-4347-9D1C-FF5FFE9476B1}" type="slidenum">
               <a:rPr lang="en-US" smtClean="0"/>
-              <a:t>8</a:t>
+              <a:t>5</a:t>
             </a:fld>
-            <a:endParaRPr lang="en-US"/>
+            <a:endParaRPr lang="en-US" dirty="0"/>
           </a:p>
         </p:txBody>
       </p:sp>
     </p:spTree>
     <p:extLst>
       <p:ext uri="{BB962C8B-B14F-4D97-AF65-F5344CB8AC3E}">
-        <p14:creationId xmlns:p14="http://schemas.microsoft.com/office/powerpoint/2010/main" val="290419068"/>
+        <p14:creationId xmlns:p14="http://schemas.microsoft.com/office/powerpoint/2010/main" val="2740084309"/>
       </p:ext>
     </p:extLst>
   </p:cSld>
@@ -4043,7 +4199,46 @@
           <a:bodyPr/>
           <a:lstStyle/>
           <a:p>
-            <a:endParaRPr lang="en-US" dirty="0"/>
+            <a:r>
+              <a:rPr lang="en-US" sz="1200" kern="1200" dirty="0">
+                <a:solidFill>
+                  <a:schemeClr val="tx1"/>
+                </a:solidFill>
+                <a:effectLst/>
+                <a:latin typeface="+mn-lt"/>
+                <a:ea typeface="+mn-ea"/>
+                <a:cs typeface="+mn-cs"/>
+              </a:rPr>
+              <a:t>We used the synthetic IBM Attrition data for our experiment. </a:t>
+            </a:r>
+          </a:p>
+          <a:p>
+            <a:r>
+              <a:rPr lang="en-US" sz="1200" kern="1200" dirty="0">
+                <a:solidFill>
+                  <a:schemeClr val="tx1"/>
+                </a:solidFill>
+                <a:effectLst/>
+                <a:latin typeface="+mn-lt"/>
+                <a:ea typeface="+mn-ea"/>
+                <a:cs typeface="+mn-cs"/>
+              </a:rPr>
+              <a:t>As you can see the data is unbalanced with yellow = they left. </a:t>
+            </a:r>
+          </a:p>
+          <a:p>
+            <a:r>
+              <a:rPr lang="en-US" sz="1200" kern="1200" dirty="0">
+                <a:solidFill>
+                  <a:schemeClr val="tx1"/>
+                </a:solidFill>
+                <a:effectLst/>
+                <a:latin typeface="+mn-lt"/>
+                <a:ea typeface="+mn-ea"/>
+                <a:cs typeface="+mn-cs"/>
+              </a:rPr>
+              <a:t>The younger Age groups have a greater percentage of attrition.  </a:t>
+            </a:r>
           </a:p>
         </p:txBody>
       </p:sp>
@@ -4064,16 +4259,463 @@
           <a:p>
             <a:fld id="{BAA9633A-392A-4347-9D1C-FF5FFE9476B1}" type="slidenum">
               <a:rPr lang="en-US" smtClean="0"/>
-              <a:t>11</a:t>
+              <a:t>6</a:t>
             </a:fld>
-            <a:endParaRPr lang="en-US"/>
+            <a:endParaRPr lang="en-US" dirty="0"/>
           </a:p>
         </p:txBody>
       </p:sp>
     </p:spTree>
     <p:extLst>
       <p:ext uri="{BB962C8B-B14F-4D97-AF65-F5344CB8AC3E}">
-        <p14:creationId xmlns:p14="http://schemas.microsoft.com/office/powerpoint/2010/main" val="740162289"/>
+        <p14:creationId xmlns:p14="http://schemas.microsoft.com/office/powerpoint/2010/main" val="582835802"/>
+      </p:ext>
+    </p:extLst>
+  </p:cSld>
+  <p:clrMapOvr>
+    <a:masterClrMapping/>
+  </p:clrMapOvr>
+</p:notes>
+</file>
+
+<file path=ppt/notesSlides/notesSlide7.xml><?xml version="1.0" encoding="utf-8"?>
+<p:notes xmlns:a="http://schemas.openxmlformats.org/drawingml/2006/main" xmlns:r="http://schemas.openxmlformats.org/officeDocument/2006/relationships" xmlns:p="http://schemas.openxmlformats.org/presentationml/2006/main">
+  <p:cSld>
+    <p:spTree>
+      <p:nvGrpSpPr>
+        <p:cNvPr id="1" name=""/>
+        <p:cNvGrpSpPr/>
+        <p:nvPr/>
+      </p:nvGrpSpPr>
+      <p:grpSpPr>
+        <a:xfrm>
+          <a:off x="0" y="0"/>
+          <a:ext cx="0" cy="0"/>
+          <a:chOff x="0" y="0"/>
+          <a:chExt cx="0" cy="0"/>
+        </a:xfrm>
+      </p:grpSpPr>
+      <p:sp>
+        <p:nvSpPr>
+          <p:cNvPr id="2" name="Slide Image Placeholder 1"/>
+          <p:cNvSpPr>
+            <a:spLocks noGrp="1" noRot="1" noChangeAspect="1"/>
+          </p:cNvSpPr>
+          <p:nvPr>
+            <p:ph type="sldImg"/>
+          </p:nvPr>
+        </p:nvSpPr>
+        <p:spPr/>
+      </p:sp>
+      <p:sp>
+        <p:nvSpPr>
+          <p:cNvPr id="3" name="Notes Placeholder 2"/>
+          <p:cNvSpPr>
+            <a:spLocks noGrp="1"/>
+          </p:cNvSpPr>
+          <p:nvPr>
+            <p:ph type="body" idx="1"/>
+          </p:nvPr>
+        </p:nvSpPr>
+        <p:spPr/>
+        <p:txBody>
+          <a:bodyPr/>
+          <a:lstStyle/>
+          <a:p>
+            <a:pPr marL="171450" indent="-171450">
+              <a:buFont typeface="Arial" panose="020B0604020202020204" pitchFamily="34" charset="0"/>
+              <a:buChar char="•"/>
+            </a:pPr>
+            <a:r>
+              <a:rPr lang="en-US" sz="1200" kern="1200" dirty="0">
+                <a:solidFill>
+                  <a:schemeClr val="tx1"/>
+                </a:solidFill>
+                <a:effectLst/>
+                <a:latin typeface="+mn-lt"/>
+                <a:ea typeface="+mn-ea"/>
+                <a:cs typeface="+mn-cs"/>
+              </a:rPr>
+              <a:t>Age is a protected attribute and we do not want age to influence the outcome.</a:t>
+            </a:r>
+          </a:p>
+          <a:p>
+            <a:pPr marL="171450" indent="-171450">
+              <a:buFont typeface="Arial" panose="020B0604020202020204" pitchFamily="34" charset="0"/>
+              <a:buChar char="•"/>
+            </a:pPr>
+            <a:r>
+              <a:rPr lang="en-US" sz="1200" kern="1200" dirty="0">
+                <a:solidFill>
+                  <a:schemeClr val="tx1"/>
+                </a:solidFill>
+                <a:effectLst/>
+                <a:latin typeface="+mn-lt"/>
+                <a:ea typeface="+mn-ea"/>
+                <a:cs typeface="+mn-cs"/>
+              </a:rPr>
+              <a:t>Most the time the protected attributes are just dropped, but other variables could be used as a substitute or is correlated with the protected attribute. </a:t>
+            </a:r>
+          </a:p>
+          <a:p>
+            <a:pPr marL="171450" indent="-171450">
+              <a:buFont typeface="Arial" panose="020B0604020202020204" pitchFamily="34" charset="0"/>
+              <a:buChar char="•"/>
+            </a:pPr>
+            <a:r>
+              <a:rPr lang="en-US" sz="1200" kern="1200" dirty="0">
+                <a:solidFill>
+                  <a:schemeClr val="tx1"/>
+                </a:solidFill>
+                <a:effectLst/>
+                <a:latin typeface="+mn-lt"/>
+                <a:ea typeface="+mn-ea"/>
+                <a:cs typeface="+mn-cs"/>
+              </a:rPr>
+              <a:t>For example, years worked at the company </a:t>
+            </a:r>
+          </a:p>
+          <a:p>
+            <a:pPr marL="171450" indent="-171450">
+              <a:buFont typeface="Arial" panose="020B0604020202020204" pitchFamily="34" charset="0"/>
+              <a:buChar char="•"/>
+            </a:pPr>
+            <a:r>
+              <a:rPr lang="en-US" sz="1200" kern="1200" dirty="0">
+                <a:solidFill>
+                  <a:schemeClr val="tx1"/>
+                </a:solidFill>
+                <a:effectLst/>
+                <a:latin typeface="+mn-lt"/>
+                <a:ea typeface="+mn-ea"/>
+                <a:cs typeface="+mn-cs"/>
+              </a:rPr>
+              <a:t>Our goal is to achieve or get closer to Demographic Parity by distributing accuracy across the age groups. </a:t>
+            </a:r>
+          </a:p>
+          <a:p>
+            <a:endParaRPr lang="en-US" dirty="0"/>
+          </a:p>
+        </p:txBody>
+      </p:sp>
+      <p:sp>
+        <p:nvSpPr>
+          <p:cNvPr id="4" name="Slide Number Placeholder 3"/>
+          <p:cNvSpPr>
+            <a:spLocks noGrp="1"/>
+          </p:cNvSpPr>
+          <p:nvPr>
+            <p:ph type="sldNum" sz="quarter" idx="5"/>
+          </p:nvPr>
+        </p:nvSpPr>
+        <p:spPr/>
+        <p:txBody>
+          <a:bodyPr/>
+          <a:lstStyle/>
+          <a:p>
+            <a:fld id="{BAA9633A-392A-4347-9D1C-FF5FFE9476B1}" type="slidenum">
+              <a:rPr lang="en-US" smtClean="0"/>
+              <a:t>7</a:t>
+            </a:fld>
+            <a:endParaRPr lang="en-US" dirty="0"/>
+          </a:p>
+        </p:txBody>
+      </p:sp>
+    </p:spTree>
+    <p:extLst>
+      <p:ext uri="{BB962C8B-B14F-4D97-AF65-F5344CB8AC3E}">
+        <p14:creationId xmlns:p14="http://schemas.microsoft.com/office/powerpoint/2010/main" val="3021403496"/>
+      </p:ext>
+    </p:extLst>
+  </p:cSld>
+  <p:clrMapOvr>
+    <a:masterClrMapping/>
+  </p:clrMapOvr>
+</p:notes>
+</file>
+
+<file path=ppt/notesSlides/notesSlide8.xml><?xml version="1.0" encoding="utf-8"?>
+<p:notes xmlns:a="http://schemas.openxmlformats.org/drawingml/2006/main" xmlns:r="http://schemas.openxmlformats.org/officeDocument/2006/relationships" xmlns:p="http://schemas.openxmlformats.org/presentationml/2006/main">
+  <p:cSld>
+    <p:spTree>
+      <p:nvGrpSpPr>
+        <p:cNvPr id="1" name=""/>
+        <p:cNvGrpSpPr/>
+        <p:nvPr/>
+      </p:nvGrpSpPr>
+      <p:grpSpPr>
+        <a:xfrm>
+          <a:off x="0" y="0"/>
+          <a:ext cx="0" cy="0"/>
+          <a:chOff x="0" y="0"/>
+          <a:chExt cx="0" cy="0"/>
+        </a:xfrm>
+      </p:grpSpPr>
+      <p:sp>
+        <p:nvSpPr>
+          <p:cNvPr id="2" name="Slide Image Placeholder 1"/>
+          <p:cNvSpPr>
+            <a:spLocks noGrp="1" noRot="1" noChangeAspect="1"/>
+          </p:cNvSpPr>
+          <p:nvPr>
+            <p:ph type="sldImg"/>
+          </p:nvPr>
+        </p:nvSpPr>
+        <p:spPr/>
+      </p:sp>
+      <p:sp>
+        <p:nvSpPr>
+          <p:cNvPr id="3" name="Notes Placeholder 2"/>
+          <p:cNvSpPr>
+            <a:spLocks noGrp="1"/>
+          </p:cNvSpPr>
+          <p:nvPr>
+            <p:ph type="body" idx="1"/>
+          </p:nvPr>
+        </p:nvSpPr>
+        <p:spPr/>
+        <p:txBody>
+          <a:bodyPr/>
+          <a:lstStyle/>
+          <a:p>
+            <a:pPr marL="171450" indent="-171450">
+              <a:buFont typeface="Arial" panose="020B0604020202020204" pitchFamily="34" charset="0"/>
+              <a:buChar char="•"/>
+            </a:pPr>
+            <a:r>
+              <a:rPr lang="en-US" sz="1200" kern="1200" dirty="0">
+                <a:solidFill>
+                  <a:schemeClr val="tx1"/>
+                </a:solidFill>
+                <a:effectLst/>
+                <a:latin typeface="+mn-lt"/>
+                <a:ea typeface="+mn-ea"/>
+                <a:cs typeface="+mn-cs"/>
+              </a:rPr>
+              <a:t>We start with a baseline to see how close we are to demographic parity.  </a:t>
+            </a:r>
+          </a:p>
+          <a:p>
+            <a:pPr marL="171450" indent="-171450">
+              <a:buFont typeface="Arial" panose="020B0604020202020204" pitchFamily="34" charset="0"/>
+              <a:buChar char="•"/>
+            </a:pPr>
+            <a:r>
+              <a:rPr lang="en-US" sz="1200" kern="1200" dirty="0">
+                <a:solidFill>
+                  <a:schemeClr val="tx1"/>
+                </a:solidFill>
+                <a:effectLst/>
+                <a:latin typeface="+mn-lt"/>
+                <a:ea typeface="+mn-ea"/>
+                <a:cs typeface="+mn-cs"/>
+              </a:rPr>
+              <a:t>We created a simple neural net  in the fashion of a logistic regression model. The idea is not to build the most accurate model but show that an adversarial can remove bias. </a:t>
+            </a:r>
+          </a:p>
+          <a:p>
+            <a:pPr marL="171450" indent="-171450">
+              <a:buFont typeface="Arial" panose="020B0604020202020204" pitchFamily="34" charset="0"/>
+              <a:buChar char="•"/>
+            </a:pPr>
+            <a:endParaRPr lang="en-US" sz="1200" kern="1200" dirty="0">
+              <a:solidFill>
+                <a:schemeClr val="tx1"/>
+              </a:solidFill>
+              <a:effectLst/>
+              <a:latin typeface="+mn-lt"/>
+              <a:ea typeface="+mn-ea"/>
+              <a:cs typeface="+mn-cs"/>
+            </a:endParaRPr>
+          </a:p>
+          <a:p>
+            <a:pPr marL="171450" indent="-171450">
+              <a:buFont typeface="Arial" panose="020B0604020202020204" pitchFamily="34" charset="0"/>
+              <a:buChar char="•"/>
+            </a:pPr>
+            <a:r>
+              <a:rPr lang="en-US" sz="1200" kern="1200" dirty="0">
+                <a:solidFill>
+                  <a:schemeClr val="tx1"/>
+                </a:solidFill>
+                <a:effectLst/>
+                <a:latin typeface="+mn-lt"/>
+                <a:ea typeface="+mn-ea"/>
+                <a:cs typeface="+mn-cs"/>
+              </a:rPr>
+              <a:t>The adversarial framework adds in our adversarial model that tries to predict age (our protected variable).</a:t>
+            </a:r>
+          </a:p>
+          <a:p>
+            <a:pPr marL="171450" indent="-171450">
+              <a:buFont typeface="Arial" panose="020B0604020202020204" pitchFamily="34" charset="0"/>
+              <a:buChar char="•"/>
+            </a:pPr>
+            <a:r>
+              <a:rPr lang="en-US" sz="1200" kern="1200" dirty="0">
+                <a:solidFill>
+                  <a:schemeClr val="tx1"/>
+                </a:solidFill>
+                <a:effectLst/>
+                <a:latin typeface="+mn-lt"/>
+                <a:ea typeface="+mn-ea"/>
+                <a:cs typeface="+mn-cs"/>
+              </a:rPr>
+              <a:t>The adversarial and the prediction models are wrapped together with a modified MSE that has a  tunable parameter to dampen the gradients. </a:t>
+            </a:r>
+          </a:p>
+          <a:p>
+            <a:pPr marL="171450" indent="-171450">
+              <a:buFont typeface="Arial" panose="020B0604020202020204" pitchFamily="34" charset="0"/>
+              <a:buChar char="•"/>
+            </a:pPr>
+            <a:r>
+              <a:rPr lang="en-US" sz="1200" kern="1200" dirty="0">
+                <a:solidFill>
+                  <a:schemeClr val="tx1"/>
+                </a:solidFill>
+                <a:effectLst/>
+                <a:latin typeface="+mn-lt"/>
+                <a:ea typeface="+mn-ea"/>
+                <a:cs typeface="+mn-cs"/>
+              </a:rPr>
+              <a:t>The loss is maximized because we want the model to be bad at predicting age. </a:t>
+            </a:r>
+          </a:p>
+          <a:p>
+            <a:pPr marL="171450" indent="-171450">
+              <a:buFont typeface="Arial" panose="020B0604020202020204" pitchFamily="34" charset="0"/>
+              <a:buChar char="•"/>
+            </a:pPr>
+            <a:r>
+              <a:rPr lang="en-US" sz="1200" kern="1200" dirty="0">
+                <a:solidFill>
+                  <a:schemeClr val="tx1"/>
+                </a:solidFill>
+                <a:effectLst/>
+                <a:latin typeface="+mn-lt"/>
+                <a:ea typeface="+mn-ea"/>
+                <a:cs typeface="+mn-cs"/>
+              </a:rPr>
+              <a:t>The prediction algorithm is the same as in our baseline  except the weights are modified from the MSE loss function as well as its original loss function .  </a:t>
+            </a:r>
+          </a:p>
+          <a:p>
+            <a:endParaRPr lang="en-US" dirty="0"/>
+          </a:p>
+        </p:txBody>
+      </p:sp>
+      <p:sp>
+        <p:nvSpPr>
+          <p:cNvPr id="4" name="Slide Number Placeholder 3"/>
+          <p:cNvSpPr>
+            <a:spLocks noGrp="1"/>
+          </p:cNvSpPr>
+          <p:nvPr>
+            <p:ph type="sldNum" sz="quarter" idx="5"/>
+          </p:nvPr>
+        </p:nvSpPr>
+        <p:spPr/>
+        <p:txBody>
+          <a:bodyPr/>
+          <a:lstStyle/>
+          <a:p>
+            <a:fld id="{BAA9633A-392A-4347-9D1C-FF5FFE9476B1}" type="slidenum">
+              <a:rPr lang="en-US" smtClean="0"/>
+              <a:t>8</a:t>
+            </a:fld>
+            <a:endParaRPr lang="en-US" dirty="0"/>
+          </a:p>
+        </p:txBody>
+      </p:sp>
+    </p:spTree>
+    <p:extLst>
+      <p:ext uri="{BB962C8B-B14F-4D97-AF65-F5344CB8AC3E}">
+        <p14:creationId xmlns:p14="http://schemas.microsoft.com/office/powerpoint/2010/main" val="290419068"/>
+      </p:ext>
+    </p:extLst>
+  </p:cSld>
+  <p:clrMapOvr>
+    <a:masterClrMapping/>
+  </p:clrMapOvr>
+</p:notes>
+</file>
+
+<file path=ppt/notesSlides/notesSlide9.xml><?xml version="1.0" encoding="utf-8"?>
+<p:notes xmlns:a="http://schemas.openxmlformats.org/drawingml/2006/main" xmlns:r="http://schemas.openxmlformats.org/officeDocument/2006/relationships" xmlns:p="http://schemas.openxmlformats.org/presentationml/2006/main">
+  <p:cSld>
+    <p:spTree>
+      <p:nvGrpSpPr>
+        <p:cNvPr id="1" name=""/>
+        <p:cNvGrpSpPr/>
+        <p:nvPr/>
+      </p:nvGrpSpPr>
+      <p:grpSpPr>
+        <a:xfrm>
+          <a:off x="0" y="0"/>
+          <a:ext cx="0" cy="0"/>
+          <a:chOff x="0" y="0"/>
+          <a:chExt cx="0" cy="0"/>
+        </a:xfrm>
+      </p:grpSpPr>
+      <p:sp>
+        <p:nvSpPr>
+          <p:cNvPr id="2" name="Slide Image Placeholder 1"/>
+          <p:cNvSpPr>
+            <a:spLocks noGrp="1" noRot="1" noChangeAspect="1"/>
+          </p:cNvSpPr>
+          <p:nvPr>
+            <p:ph type="sldImg"/>
+          </p:nvPr>
+        </p:nvSpPr>
+        <p:spPr/>
+      </p:sp>
+      <p:sp>
+        <p:nvSpPr>
+          <p:cNvPr id="3" name="Notes Placeholder 2"/>
+          <p:cNvSpPr>
+            <a:spLocks noGrp="1"/>
+          </p:cNvSpPr>
+          <p:nvPr>
+            <p:ph type="body" idx="1"/>
+          </p:nvPr>
+        </p:nvSpPr>
+        <p:spPr/>
+        <p:txBody>
+          <a:bodyPr/>
+          <a:lstStyle/>
+          <a:p>
+            <a:endParaRPr lang="en-US" dirty="0"/>
+          </a:p>
+        </p:txBody>
+      </p:sp>
+      <p:sp>
+        <p:nvSpPr>
+          <p:cNvPr id="4" name="Slide Number Placeholder 3"/>
+          <p:cNvSpPr>
+            <a:spLocks noGrp="1"/>
+          </p:cNvSpPr>
+          <p:nvPr>
+            <p:ph type="sldNum" sz="quarter" idx="5"/>
+          </p:nvPr>
+        </p:nvSpPr>
+        <p:spPr/>
+        <p:txBody>
+          <a:bodyPr/>
+          <a:lstStyle/>
+          <a:p>
+            <a:fld id="{BAA9633A-392A-4347-9D1C-FF5FFE9476B1}" type="slidenum">
+              <a:rPr lang="en-US" smtClean="0"/>
+              <a:t>9</a:t>
+            </a:fld>
+            <a:endParaRPr lang="en-US" dirty="0"/>
+          </a:p>
+        </p:txBody>
+      </p:sp>
+    </p:spTree>
+    <p:extLst>
+      <p:ext uri="{BB962C8B-B14F-4D97-AF65-F5344CB8AC3E}">
+        <p14:creationId xmlns:p14="http://schemas.microsoft.com/office/powerpoint/2010/main" val="1109416728"/>
       </p:ext>
     </p:extLst>
   </p:cSld>
@@ -6642,7 +7284,7 @@
             </a:lvl1pPr>
           </a:lstStyle>
           <a:p>
-            <a:endParaRPr lang="en-US"/>
+            <a:endParaRPr lang="en-US" dirty="0"/>
           </a:p>
         </p:txBody>
       </p:sp>
@@ -6682,7 +7324,7 @@
               <a:pPr/>
               <a:t>‹#›</a:t>
             </a:fld>
-            <a:endParaRPr lang="en-US"/>
+            <a:endParaRPr lang="en-US" dirty="0"/>
           </a:p>
         </p:txBody>
       </p:sp>
@@ -7318,7 +7960,7 @@
               <a:rPr lang="en-US" smtClean="0"/>
               <a:t>1</a:t>
             </a:fld>
-            <a:endParaRPr lang="en-US"/>
+            <a:endParaRPr lang="en-US" dirty="0"/>
           </a:p>
         </p:txBody>
       </p:sp>
@@ -7441,7 +8083,7 @@
             <a:pPr lvl="1"/>
             <a:r>
               <a:rPr lang="en-US" sz="2400" dirty="0"/>
-              <a:t>If the proportion of positive predictions in the subgroups are closed to each other</a:t>
+              <a:t>If the proportion of positive predictions in the subgroups are close to each other</a:t>
             </a:r>
           </a:p>
           <a:p>
@@ -7526,7 +8168,7 @@
           <p:nvPr/>
         </p:nvPicPr>
         <p:blipFill>
-          <a:blip r:embed="rId2"/>
+          <a:blip r:embed="rId3"/>
           <a:stretch>
             <a:fillRect/>
           </a:stretch>
@@ -7553,10 +8195,10 @@
   </p:clrMapOvr>
   <mc:AlternateContent xmlns:mc="http://schemas.openxmlformats.org/markup-compatibility/2006">
     <mc:Choice xmlns:p14="http://schemas.microsoft.com/office/powerpoint/2010/main" Requires="p14">
-      <p:transition p14:dur="10" advClick="0" advTm="20000"/>
+      <p:transition p14:dur="10" advClick="0" advTm="25000"/>
     </mc:Choice>
     <mc:Fallback>
-      <p:transition advClick="0" advTm="20000"/>
+      <p:transition advClick="0" advTm="25000"/>
     </mc:Fallback>
   </mc:AlternateContent>
 </p:sld>
@@ -7639,7 +8281,14 @@
             <a:pPr lvl="1"/>
             <a:r>
               <a:rPr lang="en-US" dirty="0"/>
-              <a:t>No significant pre-processing on the data perhaps as a future exercise</a:t>
+              <a:t>No significant pre-processing on the data </a:t>
+            </a:r>
+          </a:p>
+          <a:p>
+            <a:pPr lvl="1"/>
+            <a:r>
+              <a:rPr lang="en-US" dirty="0"/>
+              <a:t>Perhaps a future exercise</a:t>
             </a:r>
           </a:p>
           <a:p>
@@ -7698,10 +8347,10 @@
   </p:clrMapOvr>
   <mc:AlternateContent xmlns:mc="http://schemas.openxmlformats.org/markup-compatibility/2006">
     <mc:Choice xmlns:p14="http://schemas.microsoft.com/office/powerpoint/2010/main" Requires="p14">
-      <p:transition p14:dur="10" advClick="0" advTm="20000"/>
+      <p:transition p14:dur="10" advClick="0" advTm="25000"/>
     </mc:Choice>
     <mc:Fallback>
-      <p:transition advClick="0" advTm="20000"/>
+      <p:transition advClick="0" advTm="25000"/>
     </mc:Fallback>
   </mc:AlternateContent>
 </p:sld>
@@ -7852,10 +8501,10 @@
   </p:clrMapOvr>
   <mc:AlternateContent xmlns:mc="http://schemas.openxmlformats.org/markup-compatibility/2006">
     <mc:Choice xmlns:p14="http://schemas.microsoft.com/office/powerpoint/2010/main" Requires="p14">
-      <p:transition p14:dur="10" advClick="0" advTm="20000"/>
+      <p:transition p14:dur="10" advClick="0" advTm="25000"/>
     </mc:Choice>
     <mc:Fallback>
-      <p:transition advClick="0" advTm="20000"/>
+      <p:transition advClick="0" advTm="25000"/>
     </mc:Fallback>
   </mc:AlternateContent>
 </p:sld>
@@ -7938,7 +8587,7 @@
           <p:nvPr/>
         </p:nvPicPr>
         <p:blipFill>
-          <a:blip r:embed="rId2"/>
+          <a:blip r:embed="rId3"/>
           <a:stretch>
             <a:fillRect/>
           </a:stretch>
@@ -8006,11 +8655,11 @@
   <p:clrMapOvr>
     <a:masterClrMapping/>
   </p:clrMapOvr>
-  <mc:AlternateContent xmlns:mc="http://schemas.openxmlformats.org/markup-compatibility/2006">
-    <mc:Choice xmlns:p14="http://schemas.microsoft.com/office/powerpoint/2010/main" Requires="p14">
+  <mc:AlternateContent xmlns:mc="http://schemas.openxmlformats.org/markup-compatibility/2006" xmlns:p14="http://schemas.microsoft.com/office/powerpoint/2010/main">
+    <mc:Choice Requires="p14">
       <p:transition p14:dur="10" advClick="0" advTm="25000"/>
     </mc:Choice>
-    <mc:Fallback>
+    <mc:Fallback xmlns="">
       <p:transition advClick="0" advTm="25000"/>
     </mc:Fallback>
   </mc:AlternateContent>
@@ -8094,7 +8743,7 @@
           <p:nvPr/>
         </p:nvPicPr>
         <p:blipFill>
-          <a:blip r:embed="rId2"/>
+          <a:blip r:embed="rId3"/>
           <a:stretch>
             <a:fillRect/>
           </a:stretch>
@@ -8157,7 +8806,7 @@
           <a:lstStyle/>
           <a:p>
             <a:pPr algn="ctr"/>
-            <a:endParaRPr lang="en-US"/>
+            <a:endParaRPr lang="en-US" dirty="0"/>
           </a:p>
         </p:txBody>
       </p:sp>
@@ -8209,7 +8858,7 @@
           <a:lstStyle/>
           <a:p>
             <a:pPr algn="ctr"/>
-            <a:endParaRPr lang="en-US"/>
+            <a:endParaRPr lang="en-US" dirty="0"/>
           </a:p>
         </p:txBody>
       </p:sp>
@@ -8261,7 +8910,7 @@
           <a:lstStyle/>
           <a:p>
             <a:pPr algn="ctr"/>
-            <a:endParaRPr lang="en-US"/>
+            <a:endParaRPr lang="en-US" dirty="0"/>
           </a:p>
         </p:txBody>
       </p:sp>
@@ -8395,11 +9044,11 @@
   <p:clrMapOvr>
     <a:masterClrMapping/>
   </p:clrMapOvr>
-  <mc:AlternateContent xmlns:mc="http://schemas.openxmlformats.org/markup-compatibility/2006">
-    <mc:Choice xmlns:p14="http://schemas.microsoft.com/office/powerpoint/2010/main" Requires="p14">
+  <mc:AlternateContent xmlns:mc="http://schemas.openxmlformats.org/markup-compatibility/2006" xmlns:p14="http://schemas.microsoft.com/office/powerpoint/2010/main">
+    <mc:Choice Requires="p14">
       <p:transition p14:dur="10" advClick="0" advTm="30000"/>
     </mc:Choice>
-    <mc:Fallback>
+    <mc:Fallback xmlns="">
       <p:transition advClick="0" advTm="30000"/>
     </mc:Fallback>
   </mc:AlternateContent>
@@ -8495,7 +9144,7 @@
         </p:xfrm>
         <a:graphic>
           <a:graphicData uri="http://schemas.openxmlformats.org/drawingml/2006/diagram">
-            <dgm:relIds xmlns:dgm="http://schemas.openxmlformats.org/drawingml/2006/diagram" xmlns:r="http://schemas.openxmlformats.org/officeDocument/2006/relationships" r:dm="rId2" r:lo="rId3" r:qs="rId4" r:cs="rId5"/>
+            <dgm:relIds xmlns:dgm="http://schemas.openxmlformats.org/drawingml/2006/diagram" xmlns:r="http://schemas.openxmlformats.org/officeDocument/2006/relationships" r:dm="rId3" r:lo="rId4" r:qs="rId5" r:cs="rId6"/>
           </a:graphicData>
         </a:graphic>
       </p:graphicFrame>
@@ -8669,11 +9318,11 @@
   <p:clrMapOvr>
     <a:masterClrMapping/>
   </p:clrMapOvr>
-  <mc:AlternateContent xmlns:mc="http://schemas.openxmlformats.org/markup-compatibility/2006">
-    <mc:Choice xmlns:p14="http://schemas.microsoft.com/office/powerpoint/2010/main" Requires="p14">
+  <mc:AlternateContent xmlns:mc="http://schemas.openxmlformats.org/markup-compatibility/2006" xmlns:p14="http://schemas.microsoft.com/office/powerpoint/2010/main">
+    <mc:Choice Requires="p14">
       <p:transition p14:dur="10" advClick="0" advTm="25000"/>
     </mc:Choice>
-    <mc:Fallback>
+    <mc:Fallback xmlns="">
       <p:transition advClick="0" advTm="25000"/>
     </mc:Fallback>
   </mc:AlternateContent>
@@ -9031,7 +9680,7 @@
               <a:buNone/>
             </a:pPr>
             <a:r>
-              <a:rPr lang="en-US" sz="800">
+              <a:rPr lang="en-US" sz="800" dirty="0">
                 <a:hlinkClick r:id="rId6"/>
               </a:rPr>
               <a:t>https://ya-webdesign.com/imgdownload.html</a:t>
@@ -9088,11 +9737,11 @@
   <p:clrMapOvr>
     <a:masterClrMapping/>
   </p:clrMapOvr>
-  <mc:AlternateContent xmlns:mc="http://schemas.openxmlformats.org/markup-compatibility/2006">
-    <mc:Choice xmlns:p14="http://schemas.microsoft.com/office/powerpoint/2010/main" Requires="p14">
+  <mc:AlternateContent xmlns:mc="http://schemas.openxmlformats.org/markup-compatibility/2006" xmlns:p14="http://schemas.microsoft.com/office/powerpoint/2010/main">
+    <mc:Choice Requires="p14">
       <p:transition p14:dur="10" advClick="0" advTm="30000"/>
     </mc:Choice>
-    <mc:Fallback>
+    <mc:Fallback xmlns="">
       <p:transition advClick="0" advTm="30000"/>
     </mc:Fallback>
   </mc:AlternateContent>
@@ -9265,11 +9914,11 @@
   <p:clrMapOvr>
     <a:masterClrMapping/>
   </p:clrMapOvr>
-  <mc:AlternateContent xmlns:mc="http://schemas.openxmlformats.org/markup-compatibility/2006">
-    <mc:Choice xmlns:p14="http://schemas.microsoft.com/office/powerpoint/2010/main" Requires="p14">
+  <mc:AlternateContent xmlns:mc="http://schemas.openxmlformats.org/markup-compatibility/2006" xmlns:p14="http://schemas.microsoft.com/office/powerpoint/2010/main">
+    <mc:Choice Requires="p14">
       <p:transition p14:dur="10" advClick="0" advTm="20000"/>
     </mc:Choice>
-    <mc:Fallback>
+    <mc:Fallback xmlns="">
       <p:transition advClick="0" advTm="20000"/>
     </mc:Fallback>
   </mc:AlternateContent>
@@ -10899,11 +11548,11 @@
   <p:clrMapOvr>
     <a:masterClrMapping/>
   </p:clrMapOvr>
-  <mc:AlternateContent xmlns:mc="http://schemas.openxmlformats.org/markup-compatibility/2006">
-    <mc:Choice xmlns:p14="http://schemas.microsoft.com/office/powerpoint/2010/main" Requires="p14">
+  <mc:AlternateContent xmlns:mc="http://schemas.openxmlformats.org/markup-compatibility/2006" xmlns:p14="http://schemas.microsoft.com/office/powerpoint/2010/main">
+    <mc:Choice Requires="p14">
       <p:transition p14:dur="10" advClick="0" advTm="45000"/>
     </mc:Choice>
-    <mc:Fallback>
+    <mc:Fallback xmlns="">
       <p:transition advClick="0" advTm="45000"/>
     </mc:Fallback>
   </mc:AlternateContent>
@@ -11070,7 +11719,7 @@
           <p:nvPr/>
         </p:nvPicPr>
         <p:blipFill>
-          <a:blip r:embed="rId2"/>
+          <a:blip r:embed="rId3"/>
           <a:stretch>
             <a:fillRect/>
           </a:stretch>
@@ -11097,10 +11746,10 @@
   </p:clrMapOvr>
   <mc:AlternateContent xmlns:mc="http://schemas.openxmlformats.org/markup-compatibility/2006">
     <mc:Choice xmlns:p14="http://schemas.microsoft.com/office/powerpoint/2010/main" Requires="p14">
-      <p:transition p14:dur="10" advClick="0" advTm="20000"/>
+      <p:transition p14:dur="10" advClick="0" advTm="25000"/>
     </mc:Choice>
     <mc:Fallback>
-      <p:transition advClick="0" advTm="20000"/>
+      <p:transition advClick="0" advTm="25000"/>
     </mc:Fallback>
   </mc:AlternateContent>
 </p:sld>

</xml_diff>